<commit_message>
Small modification on the slides ARC 6
</commit_message>
<xml_diff>
--- a/Presentations/ARC 6 PROJECT/ARC6-2016.pptx
+++ b/Presentations/ARC 6 PROJECT/ARC6-2016.pptx
@@ -5045,20 +5045,7 @@
                   <a:ea typeface="Consolas" charset="0"/>
                   <a:cs typeface="Consolas" charset="0"/>
                 </a:rPr>
-                <a:t> </a:t>
-              </a:r>
-              <a:r>
-                <a:rPr lang="fr-FR" sz="1200" i="1" dirty="0" smtClean="0">
-                  <a:solidFill>
-                    <a:schemeClr val="tx1">
-                      <a:lumMod val="65000"/>
-                      <a:lumOff val="35000"/>
-                    </a:schemeClr>
-                  </a:solidFill>
-                  <a:ea typeface="Consolas" charset="0"/>
-                  <a:cs typeface="Consolas" charset="0"/>
-                </a:rPr>
-                <a:t>data sources </a:t>
+                <a:t> data sources </a:t>
               </a:r>
               <a:r>
                 <a:rPr lang="en-GB" sz="1200" i="1" dirty="0" smtClean="0">
@@ -5122,16 +5109,6 @@
                 </a:rPr>
                 <a:t>Exported schemata</a:t>
               </a:r>
-              <a:endParaRPr lang="en-US" sz="1200" i="1" dirty="0" smtClean="0">
-                <a:solidFill>
-                  <a:schemeClr val="tx1">
-                    <a:lumMod val="65000"/>
-                    <a:lumOff val="35000"/>
-                  </a:schemeClr>
-                </a:solidFill>
-                <a:ea typeface="Consolas" charset="0"/>
-                <a:cs typeface="Consolas" charset="0"/>
-              </a:endParaRPr>
             </a:p>
           </p:txBody>
         </p:sp>
@@ -5171,16 +5148,6 @@
                 </a:rPr>
                 <a:t>Global schema</a:t>
               </a:r>
-              <a:endParaRPr lang="fr-FR" sz="1200" i="1" dirty="0" smtClean="0">
-                <a:solidFill>
-                  <a:schemeClr val="tx1">
-                    <a:lumMod val="65000"/>
-                    <a:lumOff val="35000"/>
-                  </a:schemeClr>
-                </a:solidFill>
-                <a:ea typeface="Consolas" charset="0"/>
-                <a:cs typeface="Consolas" charset="0"/>
-              </a:endParaRPr>
             </a:p>
           </p:txBody>
         </p:sp>
@@ -5523,11 +5490,7 @@
             </a:r>
             <a:r>
               <a:rPr lang="is-IS" sz="1400" i="1" dirty="0" smtClean="0"/>
-              <a:t>Domenig &amp; Dittrich 1999 Sigmod </a:t>
-            </a:r>
-            <a:r>
-              <a:rPr lang="is-IS" sz="1400" i="1" dirty="0" smtClean="0"/>
-              <a:t>Record)</a:t>
+              <a:t>Domenig &amp; Dittrich 1999 Sigmod Record)</a:t>
             </a:r>
             <a:endParaRPr lang="en-GB" sz="1400" i="1" dirty="0"/>
           </a:p>
@@ -6256,16 +6219,6 @@
                 </a:rPr>
                 <a:t>Distributed data services</a:t>
               </a:r>
-              <a:endParaRPr lang="fr-FR" sz="1200" i="1" dirty="0" smtClean="0">
-                <a:solidFill>
-                  <a:schemeClr val="tx1">
-                    <a:lumMod val="65000"/>
-                    <a:lumOff val="35000"/>
-                  </a:schemeClr>
-                </a:solidFill>
-                <a:ea typeface="Consolas" charset="0"/>
-                <a:cs typeface="Consolas" charset="0"/>
-              </a:endParaRPr>
             </a:p>
           </p:txBody>
         </p:sp>
@@ -6305,16 +6258,6 @@
                 </a:rPr>
                 <a:t>Exported API</a:t>
               </a:r>
-              <a:endParaRPr lang="en-US" sz="1200" i="1" dirty="0" smtClean="0">
-                <a:solidFill>
-                  <a:schemeClr val="tx1">
-                    <a:lumMod val="65000"/>
-                    <a:lumOff val="35000"/>
-                  </a:schemeClr>
-                </a:solidFill>
-                <a:ea typeface="Consolas" charset="0"/>
-                <a:cs typeface="Consolas" charset="0"/>
-              </a:endParaRPr>
             </a:p>
           </p:txBody>
         </p:sp>
@@ -6668,14 +6611,14 @@
               </a:ln>
               <a:extLst>
                 <a:ext uri="{909E8E84-426E-40dd-AFC4-6F175D3DCCD1}">
-                  <a14:hiddenFill xmlns:a14="http://schemas.microsoft.com/office/drawing/2010/main" xmlns="">
+                  <a14:hiddenFill xmlns="" xmlns:a14="http://schemas.microsoft.com/office/drawing/2010/main">
                     <a:solidFill>
                       <a:srgbClr val="FFFFFF"/>
                     </a:solidFill>
                   </a14:hiddenFill>
                 </a:ext>
                 <a:ext uri="{91240B29-F687-4f45-9708-019B960494DF}">
-                  <a14:hiddenLine xmlns:a14="http://schemas.microsoft.com/office/drawing/2010/main" xmlns="" w="9525">
+                  <a14:hiddenLine xmlns="" xmlns:a14="http://schemas.microsoft.com/office/drawing/2010/main" w="9525">
                     <a:solidFill>
                       <a:srgbClr val="000000"/>
                     </a:solidFill>
@@ -6729,14 +6672,14 @@
               </a:ln>
               <a:extLst>
                 <a:ext uri="{909E8E84-426E-40dd-AFC4-6F175D3DCCD1}">
-                  <a14:hiddenFill xmlns:a14="http://schemas.microsoft.com/office/drawing/2010/main" xmlns="">
+                  <a14:hiddenFill xmlns="" xmlns:a14="http://schemas.microsoft.com/office/drawing/2010/main">
                     <a:solidFill>
                       <a:srgbClr val="FFFFFF"/>
                     </a:solidFill>
                   </a14:hiddenFill>
                 </a:ext>
                 <a:ext uri="{91240B29-F687-4f45-9708-019B960494DF}">
-                  <a14:hiddenLine xmlns:a14="http://schemas.microsoft.com/office/drawing/2010/main" xmlns="" w="9525">
+                  <a14:hiddenLine xmlns="" xmlns:a14="http://schemas.microsoft.com/office/drawing/2010/main" w="9525">
                     <a:solidFill>
                       <a:srgbClr val="000000"/>
                     </a:solidFill>
@@ -6790,14 +6733,14 @@
               </a:ln>
               <a:extLst>
                 <a:ext uri="{909E8E84-426E-40dd-AFC4-6F175D3DCCD1}">
-                  <a14:hiddenFill xmlns:a14="http://schemas.microsoft.com/office/drawing/2010/main" xmlns="">
+                  <a14:hiddenFill xmlns="" xmlns:a14="http://schemas.microsoft.com/office/drawing/2010/main">
                     <a:solidFill>
                       <a:srgbClr val="FFFFFF"/>
                     </a:solidFill>
                   </a14:hiddenFill>
                 </a:ext>
                 <a:ext uri="{91240B29-F687-4f45-9708-019B960494DF}">
-                  <a14:hiddenLine xmlns:a14="http://schemas.microsoft.com/office/drawing/2010/main" xmlns="" w="9525">
+                  <a14:hiddenLine xmlns="" xmlns:a14="http://schemas.microsoft.com/office/drawing/2010/main" w="9525">
                     <a:solidFill>
                       <a:srgbClr val="000000"/>
                     </a:solidFill>
@@ -6831,14 +6774,14 @@
               </a:ln>
               <a:extLst>
                 <a:ext uri="{909E8E84-426E-40dd-AFC4-6F175D3DCCD1}">
-                  <a14:hiddenFill xmlns:a14="http://schemas.microsoft.com/office/drawing/2010/main" xmlns="">
+                  <a14:hiddenFill xmlns="" xmlns:a14="http://schemas.microsoft.com/office/drawing/2010/main">
                     <a:solidFill>
                       <a:srgbClr val="FFFFFF"/>
                     </a:solidFill>
                   </a14:hiddenFill>
                 </a:ext>
                 <a:ext uri="{91240B29-F687-4f45-9708-019B960494DF}">
-                  <a14:hiddenLine xmlns:a14="http://schemas.microsoft.com/office/drawing/2010/main" xmlns="" w="9525">
+                  <a14:hiddenLine xmlns="" xmlns:a14="http://schemas.microsoft.com/office/drawing/2010/main" w="9525">
                     <a:solidFill>
                       <a:srgbClr val="000000"/>
                     </a:solidFill>
@@ -7421,136 +7364,7 @@
   <p:timing>
     <p:tnLst>
       <p:par>
-        <p:cTn id="1" dur="indefinite" restart="never" nodeType="tmRoot">
-          <p:childTnLst>
-            <p:seq concurrent="1" nextAc="seek">
-              <p:cTn id="2" dur="indefinite" nodeType="mainSeq">
-                <p:childTnLst>
-                  <p:par>
-                    <p:cTn id="3" fill="hold">
-                      <p:stCondLst>
-                        <p:cond delay="indefinite"/>
-                      </p:stCondLst>
-                      <p:childTnLst>
-                        <p:par>
-                          <p:cTn id="4" fill="hold">
-                            <p:stCondLst>
-                              <p:cond delay="0"/>
-                            </p:stCondLst>
-                            <p:childTnLst>
-                              <p:par>
-                                <p:cTn id="5" presetID="10" presetClass="entr" presetSubtype="0" fill="hold" nodeType="clickEffect">
-                                  <p:stCondLst>
-                                    <p:cond delay="0"/>
-                                  </p:stCondLst>
-                                  <p:childTnLst>
-                                    <p:set>
-                                      <p:cBhvr>
-                                        <p:cTn id="6" dur="1" fill="hold">
-                                          <p:stCondLst>
-                                            <p:cond delay="0"/>
-                                          </p:stCondLst>
-                                        </p:cTn>
-                                        <p:tgtEl>
-                                          <p:spTgt spid="63"/>
-                                        </p:tgtEl>
-                                        <p:attrNameLst>
-                                          <p:attrName>style.visibility</p:attrName>
-                                        </p:attrNameLst>
-                                      </p:cBhvr>
-                                      <p:to>
-                                        <p:strVal val="visible"/>
-                                      </p:to>
-                                    </p:set>
-                                    <p:animEffect transition="in" filter="fade">
-                                      <p:cBhvr>
-                                        <p:cTn id="7" dur="500"/>
-                                        <p:tgtEl>
-                                          <p:spTgt spid="63"/>
-                                        </p:tgtEl>
-                                      </p:cBhvr>
-                                    </p:animEffect>
-                                  </p:childTnLst>
-                                </p:cTn>
-                              </p:par>
-                            </p:childTnLst>
-                          </p:cTn>
-                        </p:par>
-                      </p:childTnLst>
-                    </p:cTn>
-                  </p:par>
-                  <p:par>
-                    <p:cTn id="8" fill="hold">
-                      <p:stCondLst>
-                        <p:cond delay="indefinite"/>
-                      </p:stCondLst>
-                      <p:childTnLst>
-                        <p:par>
-                          <p:cTn id="9" fill="hold">
-                            <p:stCondLst>
-                              <p:cond delay="0"/>
-                            </p:stCondLst>
-                            <p:childTnLst>
-                              <p:par>
-                                <p:cTn id="10" presetID="10" presetClass="entr" presetSubtype="0" fill="hold" nodeType="clickEffect">
-                                  <p:stCondLst>
-                                    <p:cond delay="0"/>
-                                  </p:stCondLst>
-                                  <p:childTnLst>
-                                    <p:set>
-                                      <p:cBhvr>
-                                        <p:cTn id="11" dur="1" fill="hold">
-                                          <p:stCondLst>
-                                            <p:cond delay="0"/>
-                                          </p:stCondLst>
-                                        </p:cTn>
-                                        <p:tgtEl>
-                                          <p:spTgt spid="49"/>
-                                        </p:tgtEl>
-                                        <p:attrNameLst>
-                                          <p:attrName>style.visibility</p:attrName>
-                                        </p:attrNameLst>
-                                      </p:cBhvr>
-                                      <p:to>
-                                        <p:strVal val="visible"/>
-                                      </p:to>
-                                    </p:set>
-                                    <p:animEffect transition="in" filter="fade">
-                                      <p:cBhvr>
-                                        <p:cTn id="12" dur="500"/>
-                                        <p:tgtEl>
-                                          <p:spTgt spid="49"/>
-                                        </p:tgtEl>
-                                      </p:cBhvr>
-                                    </p:animEffect>
-                                  </p:childTnLst>
-                                </p:cTn>
-                              </p:par>
-                            </p:childTnLst>
-                          </p:cTn>
-                        </p:par>
-                      </p:childTnLst>
-                    </p:cTn>
-                  </p:par>
-                </p:childTnLst>
-              </p:cTn>
-              <p:prevCondLst>
-                <p:cond evt="onPrev" delay="0">
-                  <p:tgtEl>
-                    <p:sldTgt/>
-                  </p:tgtEl>
-                </p:cond>
-              </p:prevCondLst>
-              <p:nextCondLst>
-                <p:cond evt="onNext" delay="0">
-                  <p:tgtEl>
-                    <p:sldTgt/>
-                  </p:tgtEl>
-                </p:cond>
-              </p:nextCondLst>
-            </p:seq>
-          </p:childTnLst>
-        </p:cTn>
+        <p:cTn id="1" dur="indefinite" restart="never" nodeType="tmRoot"/>
       </p:par>
     </p:tnLst>
   </p:timing>

</xml_diff>